<commit_message>
Updated Notes.pptx with additional comments. Added conversion script to convert bag2csv file.
</commit_message>
<xml_diff>
--- a/documentation/Notes.pptx
+++ b/documentation/Notes.pptx
@@ -5,10 +5,10 @@
     <p:sldMasterId id="2147483648" r:id="rId2"/>
   </p:sldMasterIdLst>
   <p:notesMasterIdLst>
-    <p:notesMasterId r:id="rId17"/>
+    <p:notesMasterId r:id="rId16"/>
   </p:notesMasterIdLst>
   <p:handoutMasterIdLst>
-    <p:handoutMasterId r:id="rId18"/>
+    <p:handoutMasterId r:id="rId17"/>
   </p:handoutMasterIdLst>
   <p:sldIdLst>
     <p:sldId id="256" r:id="rId3"/>
@@ -16,15 +16,14 @@
     <p:sldId id="266" r:id="rId5"/>
     <p:sldId id="267" r:id="rId6"/>
     <p:sldId id="268" r:id="rId7"/>
-    <p:sldId id="257" r:id="rId8"/>
-    <p:sldId id="258" r:id="rId9"/>
-    <p:sldId id="259" r:id="rId10"/>
-    <p:sldId id="260" r:id="rId11"/>
-    <p:sldId id="261" r:id="rId12"/>
-    <p:sldId id="262" r:id="rId13"/>
-    <p:sldId id="263" r:id="rId14"/>
-    <p:sldId id="264" r:id="rId15"/>
-    <p:sldId id="269" r:id="rId16"/>
+    <p:sldId id="258" r:id="rId8"/>
+    <p:sldId id="259" r:id="rId9"/>
+    <p:sldId id="260" r:id="rId10"/>
+    <p:sldId id="261" r:id="rId11"/>
+    <p:sldId id="262" r:id="rId12"/>
+    <p:sldId id="263" r:id="rId13"/>
+    <p:sldId id="264" r:id="rId14"/>
+    <p:sldId id="269" r:id="rId15"/>
   </p:sldIdLst>
   <p:sldSz cx="10080625" cy="7559675"/>
   <p:notesSz cx="7772400" cy="10058400"/>
@@ -123,6 +122,11 @@
       </a:defRPr>
     </a:lvl9pPr>
   </p:defaultTextStyle>
+  <p:extLst>
+    <p:ext uri="{EFAFB233-063F-42B5-8137-9DF3F51BA10A}">
+      <p15:sldGuideLst xmlns:p15="http://schemas.microsoft.com/office/powerpoint/2012/main"/>
+    </p:ext>
+  </p:extLst>
 </p:presentation>
 </file>
 
@@ -208,7 +212,7 @@
           <a:p>
             <a:fld id="{1B64DC8B-8F28-4F4B-896A-9FF3FDF929B1}" type="datetimeFigureOut">
               <a:rPr lang="en-US" smtClean="0"/>
-              <a:t>9/1/2017</a:t>
+              <a:t>9/5/2017</a:t>
             </a:fld>
             <a:endParaRPr lang="en-US"/>
           </a:p>
@@ -373,7 +377,7 @@
           <a:p>
             <a:fld id="{99AF66EB-8E34-4204-AD05-A64EF2717AAE}" type="datetimeFigureOut">
               <a:rPr lang="en-US" smtClean="0"/>
-              <a:t>9/1/2017</a:t>
+              <a:t>9/5/2017</a:t>
             </a:fld>
             <a:endParaRPr lang="en-US"/>
           </a:p>
@@ -876,7 +880,7 @@
     </p:spTree>
     <p:extLst>
       <p:ext uri="{BB962C8B-B14F-4D97-AF65-F5344CB8AC3E}">
-        <p14:creationId xmlns:p14="http://schemas.microsoft.com/office/powerpoint/2010/main" val="2634362419"/>
+        <p14:creationId xmlns:p14="http://schemas.microsoft.com/office/powerpoint/2010/main" val="1040836919"/>
       </p:ext>
     </p:extLst>
   </p:cSld>
@@ -998,7 +1002,7 @@
     </p:spTree>
     <p:extLst>
       <p:ext uri="{BB962C8B-B14F-4D97-AF65-F5344CB8AC3E}">
-        <p14:creationId xmlns:p14="http://schemas.microsoft.com/office/powerpoint/2010/main" val="1040836919"/>
+        <p14:creationId xmlns:p14="http://schemas.microsoft.com/office/powerpoint/2010/main" val="3758648661"/>
       </p:ext>
     </p:extLst>
   </p:cSld>
@@ -1120,7 +1124,7 @@
     </p:spTree>
     <p:extLst>
       <p:ext uri="{BB962C8B-B14F-4D97-AF65-F5344CB8AC3E}">
-        <p14:creationId xmlns:p14="http://schemas.microsoft.com/office/powerpoint/2010/main" val="3758648661"/>
+        <p14:creationId xmlns:p14="http://schemas.microsoft.com/office/powerpoint/2010/main" val="2067453108"/>
       </p:ext>
     </p:extLst>
   </p:cSld>
@@ -1234,128 +1238,6 @@
             <a:fld id="{19772861-E0D1-49AA-A891-8EDA1938F3F7}" type="slidenum">
               <a:rPr lang="en-US" smtClean="0"/>
               <a:t>13</a:t>
-            </a:fld>
-            <a:endParaRPr lang="en-US"/>
-          </a:p>
-        </p:txBody>
-      </p:sp>
-    </p:spTree>
-    <p:extLst>
-      <p:ext uri="{BB962C8B-B14F-4D97-AF65-F5344CB8AC3E}">
-        <p14:creationId xmlns:p14="http://schemas.microsoft.com/office/powerpoint/2010/main" val="2067453108"/>
-      </p:ext>
-    </p:extLst>
-  </p:cSld>
-  <p:clrMapOvr>
-    <a:masterClrMapping/>
-  </p:clrMapOvr>
-</p:notes>
-</file>
-
-<file path=ppt/notesSlides/notesSlide14.xml><?xml version="1.0" encoding="utf-8"?>
-<p:notes xmlns:a="http://schemas.openxmlformats.org/drawingml/2006/main" xmlns:r="http://schemas.openxmlformats.org/officeDocument/2006/relationships" xmlns:p="http://schemas.openxmlformats.org/presentationml/2006/main">
-  <p:cSld>
-    <p:spTree>
-      <p:nvGrpSpPr>
-        <p:cNvPr id="1" name=""/>
-        <p:cNvGrpSpPr/>
-        <p:nvPr/>
-      </p:nvGrpSpPr>
-      <p:grpSpPr>
-        <a:xfrm>
-          <a:off x="0" y="0"/>
-          <a:ext cx="0" cy="0"/>
-          <a:chOff x="0" y="0"/>
-          <a:chExt cx="0" cy="0"/>
-        </a:xfrm>
-      </p:grpSpPr>
-      <p:sp>
-        <p:nvSpPr>
-          <p:cNvPr id="2" name="Slide Image Placeholder 1"/>
-          <p:cNvSpPr>
-            <a:spLocks noGrp="1" noRot="1" noChangeAspect="1"/>
-          </p:cNvSpPr>
-          <p:nvPr>
-            <p:ph type="sldImg"/>
-          </p:nvPr>
-        </p:nvSpPr>
-        <p:spPr/>
-      </p:sp>
-      <p:sp>
-        <p:nvSpPr>
-          <p:cNvPr id="3" name="Notes Placeholder 2"/>
-          <p:cNvSpPr>
-            <a:spLocks noGrp="1"/>
-          </p:cNvSpPr>
-          <p:nvPr>
-            <p:ph type="body" idx="1"/>
-          </p:nvPr>
-        </p:nvSpPr>
-        <p:spPr/>
-        <p:txBody>
-          <a:bodyPr/>
-          <a:lstStyle/>
-          <a:p>
-            <a:endParaRPr lang="en-US"/>
-          </a:p>
-        </p:txBody>
-      </p:sp>
-      <p:sp>
-        <p:nvSpPr>
-          <p:cNvPr id="4" name="Header Placeholder 3"/>
-          <p:cNvSpPr>
-            <a:spLocks noGrp="1"/>
-          </p:cNvSpPr>
-          <p:nvPr>
-            <p:ph type="hdr" sz="quarter" idx="10"/>
-          </p:nvPr>
-        </p:nvSpPr>
-        <p:spPr/>
-        <p:txBody>
-          <a:bodyPr/>
-          <a:lstStyle/>
-          <a:p>
-            <a:endParaRPr lang="en-US"/>
-          </a:p>
-        </p:txBody>
-      </p:sp>
-      <p:sp>
-        <p:nvSpPr>
-          <p:cNvPr id="5" name="Footer Placeholder 4"/>
-          <p:cNvSpPr>
-            <a:spLocks noGrp="1"/>
-          </p:cNvSpPr>
-          <p:nvPr>
-            <p:ph type="ftr" sz="quarter" idx="11"/>
-          </p:nvPr>
-        </p:nvSpPr>
-        <p:spPr/>
-        <p:txBody>
-          <a:bodyPr/>
-          <a:lstStyle/>
-          <a:p>
-            <a:endParaRPr lang="en-US"/>
-          </a:p>
-        </p:txBody>
-      </p:sp>
-      <p:sp>
-        <p:nvSpPr>
-          <p:cNvPr id="6" name="Slide Number Placeholder 5"/>
-          <p:cNvSpPr>
-            <a:spLocks noGrp="1"/>
-          </p:cNvSpPr>
-          <p:nvPr>
-            <p:ph type="sldNum" sz="quarter" idx="12"/>
-          </p:nvPr>
-        </p:nvSpPr>
-        <p:spPr/>
-        <p:txBody>
-          <a:bodyPr/>
-          <a:lstStyle/>
-          <a:p>
-            <a:fld id="{19772861-E0D1-49AA-A891-8EDA1938F3F7}" type="slidenum">
-              <a:rPr lang="en-US" smtClean="0"/>
-              <a:t>14</a:t>
             </a:fld>
             <a:endParaRPr lang="en-US"/>
           </a:p>
@@ -1974,7 +1856,7 @@
     </p:spTree>
     <p:extLst>
       <p:ext uri="{BB962C8B-B14F-4D97-AF65-F5344CB8AC3E}">
-        <p14:creationId xmlns:p14="http://schemas.microsoft.com/office/powerpoint/2010/main" val="3677020124"/>
+        <p14:creationId xmlns:p14="http://schemas.microsoft.com/office/powerpoint/2010/main" val="1111365486"/>
       </p:ext>
     </p:extLst>
   </p:cSld>
@@ -2096,7 +1978,7 @@
     </p:spTree>
     <p:extLst>
       <p:ext uri="{BB962C8B-B14F-4D97-AF65-F5344CB8AC3E}">
-        <p14:creationId xmlns:p14="http://schemas.microsoft.com/office/powerpoint/2010/main" val="1111365486"/>
+        <p14:creationId xmlns:p14="http://schemas.microsoft.com/office/powerpoint/2010/main" val="3567887323"/>
       </p:ext>
     </p:extLst>
   </p:cSld>
@@ -2218,7 +2100,7 @@
     </p:spTree>
     <p:extLst>
       <p:ext uri="{BB962C8B-B14F-4D97-AF65-F5344CB8AC3E}">
-        <p14:creationId xmlns:p14="http://schemas.microsoft.com/office/powerpoint/2010/main" val="3567887323"/>
+        <p14:creationId xmlns:p14="http://schemas.microsoft.com/office/powerpoint/2010/main" val="2959629270"/>
       </p:ext>
     </p:extLst>
   </p:cSld>
@@ -2340,7 +2222,7 @@
     </p:spTree>
     <p:extLst>
       <p:ext uri="{BB962C8B-B14F-4D97-AF65-F5344CB8AC3E}">
-        <p14:creationId xmlns:p14="http://schemas.microsoft.com/office/powerpoint/2010/main" val="2959629270"/>
+        <p14:creationId xmlns:p14="http://schemas.microsoft.com/office/powerpoint/2010/main" val="2634362419"/>
       </p:ext>
     </p:extLst>
   </p:cSld>
@@ -6289,7 +6171,7 @@
       </p:grpSpPr>
       <p:sp>
         <p:nvSpPr>
-          <p:cNvPr id="46" name="CustomShape 1"/>
+          <p:cNvPr id="48" name="CustomShape 1"/>
           <p:cNvSpPr/>
           <p:nvPr/>
         </p:nvSpPr>
@@ -6339,7 +6221,7 @@
                 </a:uFill>
                 <a:latin typeface="Arial"/>
               </a:rPr>
-              <a:t>twist_controller: launch files</a:t>
+              <a:t>twist_controller: dbw_node.py</a:t>
             </a:r>
             <a:endParaRPr lang="en-US" sz="1800" b="0" strike="noStrike" spc="-1">
               <a:solidFill>
@@ -6357,14 +6239,14 @@
       </p:sp>
       <p:sp>
         <p:nvSpPr>
-          <p:cNvPr id="47" name="CustomShape 2"/>
+          <p:cNvPr id="49" name="CustomShape 2"/>
           <p:cNvSpPr/>
           <p:nvPr/>
         </p:nvSpPr>
         <p:spPr>
           <a:xfrm>
             <a:off x="1373760" y="1410840"/>
-            <a:ext cx="7404120" cy="5721120"/>
+            <a:ext cx="7404120" cy="1113840"/>
           </a:xfrm>
           <a:prstGeom prst="rect">
             <a:avLst/>
@@ -6391,7 +6273,7 @@
           <a:lstStyle/>
           <a:p>
             <a:r>
-              <a:rPr lang="en-US" sz="1800" b="0" u="sng" strike="noStrike" spc="-1">
+              <a:rPr lang="en-US" sz="1800" b="0" u="sng" strike="noStrike" spc="-1" dirty="0" smtClean="0">
                 <a:solidFill>
                   <a:srgbClr val="000000"/>
                 </a:solidFill>
@@ -6402,10 +6284,25 @@
                 </a:uFill>
                 <a:latin typeface="Arial"/>
               </a:rPr>
-              <a:t>3 launch files</a:t>
-            </a:r>
-            <a:r>
-              <a:rPr lang="en-US" sz="1800" b="0" strike="noStrike" spc="-1">
+              <a:t>This node calls the throttle, steering and brake controllers, it publishes the commands to the car/simulator.</a:t>
+            </a:r>
+          </a:p>
+          <a:p>
+            <a:endParaRPr lang="en-US" u="sng" spc="-1" dirty="0">
+              <a:solidFill>
+                <a:srgbClr val="000000"/>
+              </a:solidFill>
+              <a:uFill>
+                <a:solidFill>
+                  <a:srgbClr val="FFFFFF"/>
+                </a:solidFill>
+              </a:uFill>
+              <a:latin typeface="Arial"/>
+            </a:endParaRPr>
+          </a:p>
+          <a:p>
+            <a:r>
+              <a:rPr lang="en-US" u="sng" spc="-1" dirty="0" smtClean="0">
                 <a:solidFill>
                   <a:srgbClr val="000000"/>
                 </a:solidFill>
@@ -6416,123 +6313,9 @@
                 </a:uFill>
                 <a:latin typeface="Arial"/>
               </a:rPr>
-              <a:t>:</a:t>
-            </a:r>
-          </a:p>
-          <a:p>
-            <a:r>
-              <a:rPr lang="en-US" sz="1800" b="0" strike="noStrike" spc="-1">
-                <a:solidFill>
-                  <a:srgbClr val="000000"/>
-                </a:solidFill>
-                <a:uFill>
-                  <a:solidFill>
-                    <a:srgbClr val="FFFFFF"/>
-                  </a:solidFill>
-                </a:uFill>
-                <a:latin typeface="Arial"/>
-              </a:rPr>
-              <a:t>dbw.launch – runs dbw_node.py and sets params below</a:t>
-            </a:r>
-          </a:p>
-          <a:p>
-            <a:r>
-              <a:rPr lang="en-US" sz="1800" b="0" strike="noStrike" spc="-1">
-                <a:solidFill>
-                  <a:srgbClr val="000000"/>
-                </a:solidFill>
-                <a:uFill>
-                  <a:solidFill>
-                    <a:srgbClr val="FFFFFF"/>
-                  </a:solidFill>
-                </a:uFill>
-                <a:latin typeface="Arial"/>
-              </a:rPr>
-              <a:t>dbw_test.launch – loads rosbag dbw_test.rosbag.bag</a:t>
-            </a:r>
-          </a:p>
-          <a:p>
-            <a:r>
-              <a:rPr lang="en-US" sz="1800" b="0" strike="noStrike" spc="-1">
-                <a:solidFill>
-                  <a:srgbClr val="000000"/>
-                </a:solidFill>
-                <a:uFill>
-                  <a:solidFill>
-                    <a:srgbClr val="FFFFFF"/>
-                  </a:solidFill>
-                </a:uFill>
-                <a:latin typeface="Arial"/>
-              </a:rPr>
-              <a:t>Assigns topics from rosbag:</a:t>
-            </a:r>
-          </a:p>
-          <a:p>
-            <a:r>
-              <a:rPr lang="en-US" sz="1800" b="0" strike="noStrike" spc="-1">
-                <a:solidFill>
-                  <a:srgbClr val="000000"/>
-                </a:solidFill>
-                <a:uFill>
-                  <a:solidFill>
-                    <a:srgbClr val="FFFFFF"/>
-                  </a:solidFill>
-                </a:uFill>
-                <a:latin typeface="Arial"/>
-              </a:rPr>
-              <a:t>/vehicle/throttle_cmd   =/actual/throttle_cmd </a:t>
-            </a:r>
-          </a:p>
-          <a:p>
-            <a:r>
-              <a:rPr lang="en-US" sz="1800" b="0" strike="noStrike" spc="-1">
-                <a:solidFill>
-                  <a:srgbClr val="000000"/>
-                </a:solidFill>
-                <a:uFill>
-                  <a:solidFill>
-                    <a:srgbClr val="FFFFFF"/>
-                  </a:solidFill>
-                </a:uFill>
-                <a:latin typeface="Arial"/>
-              </a:rPr>
-              <a:t>/vehicle/steering_cmd =/actual/steering_cmd</a:t>
-            </a:r>
-          </a:p>
-          <a:p>
-            <a:r>
-              <a:rPr lang="en-US" sz="1800" b="0" strike="noStrike" spc="-1">
-                <a:solidFill>
-                  <a:srgbClr val="000000"/>
-                </a:solidFill>
-                <a:uFill>
-                  <a:solidFill>
-                    <a:srgbClr val="FFFFFF"/>
-                  </a:solidFill>
-                </a:uFill>
-                <a:latin typeface="Arial"/>
-              </a:rPr>
-              <a:t>/vehicle/brake_cmd     =/actual/brake_cmd</a:t>
-            </a:r>
-          </a:p>
-          <a:p>
-            <a:r>
-              <a:rPr lang="en-US" sz="1800" b="0" strike="noStrike" spc="-1">
-                <a:solidFill>
-                  <a:srgbClr val="000000"/>
-                </a:solidFill>
-                <a:uFill>
-                  <a:solidFill>
-                    <a:srgbClr val="FFFFFF"/>
-                  </a:solidFill>
-                </a:uFill>
-                <a:latin typeface="Arial"/>
-              </a:rPr>
-              <a:t>dbw_sim.launch - runs dbw_node.py and sets params below </a:t>
-            </a:r>
-          </a:p>
-          <a:p>
-            <a:endParaRPr lang="en-US" sz="1800" b="0" strike="noStrike" spc="-1">
+              <a:t>Car model parameters are provided for use in the control design.</a:t>
+            </a:r>
+            <a:endParaRPr lang="en-US" sz="1800" b="0" strike="noStrike" spc="-1" dirty="0">
               <a:solidFill>
                 <a:srgbClr val="000000"/>
               </a:solidFill>
@@ -6546,183 +6329,7 @@
           </a:p>
           <a:p>
             <a:r>
-              <a:rPr lang="en-US" sz="1800" b="0" strike="noStrike" spc="-1">
-                <a:solidFill>
-                  <a:srgbClr val="000000"/>
-                </a:solidFill>
-                <a:uFill>
-                  <a:solidFill>
-                    <a:srgbClr val="FFFFFF"/>
-                  </a:solidFill>
-                </a:uFill>
-                <a:latin typeface="Arial"/>
-              </a:rPr>
-              <a:t>Units?</a:t>
-            </a:r>
-          </a:p>
-          <a:p>
-            <a:r>
-              <a:rPr lang="en-US" sz="1800" b="0" strike="noStrike" spc="-1">
-                <a:solidFill>
-                  <a:srgbClr val="000000"/>
-                </a:solidFill>
-                <a:uFill>
-                  <a:solidFill>
-                    <a:srgbClr val="FFFFFF"/>
-                  </a:solidFill>
-                </a:uFill>
-                <a:latin typeface="Arial"/>
-              </a:rPr>
-              <a:t> param name="vehicle_mass"      value="1736.35" </a:t>
-            </a:r>
-          </a:p>
-          <a:p>
-            <a:r>
-              <a:rPr lang="en-US" sz="1800" b="0" strike="noStrike" spc="-1">
-                <a:solidFill>
-                  <a:srgbClr val="000000"/>
-                </a:solidFill>
-                <a:uFill>
-                  <a:solidFill>
-                    <a:srgbClr val="FFFFFF"/>
-                  </a:solidFill>
-                </a:uFill>
-                <a:latin typeface="Arial"/>
-              </a:rPr>
-              <a:t> param name="fuel_capacity"       value="13.5" </a:t>
-            </a:r>
-          </a:p>
-          <a:p>
-            <a:r>
-              <a:rPr lang="en-US" sz="1800" b="0" strike="noStrike" spc="-1">
-                <a:solidFill>
-                  <a:srgbClr val="000000"/>
-                </a:solidFill>
-                <a:uFill>
-                  <a:solidFill>
-                    <a:srgbClr val="FFFFFF"/>
-                  </a:solidFill>
-                </a:uFill>
-                <a:latin typeface="Arial"/>
-              </a:rPr>
-              <a:t> param name="brake_deadband" value="0.1" </a:t>
-            </a:r>
-          </a:p>
-          <a:p>
-            <a:r>
-              <a:rPr lang="en-US" sz="1800" b="0" strike="noStrike" spc="-1">
-                <a:solidFill>
-                  <a:srgbClr val="000000"/>
-                </a:solidFill>
-                <a:uFill>
-                  <a:solidFill>
-                    <a:srgbClr val="FFFFFF"/>
-                  </a:solidFill>
-                </a:uFill>
-                <a:latin typeface="Arial"/>
-              </a:rPr>
-              <a:t> param name="decel_limit"           value="-5.0" </a:t>
-            </a:r>
-          </a:p>
-          <a:p>
-            <a:r>
-              <a:rPr lang="en-US" sz="1800" b="0" strike="noStrike" spc="-1">
-                <a:solidFill>
-                  <a:srgbClr val="000000"/>
-                </a:solidFill>
-                <a:uFill>
-                  <a:solidFill>
-                    <a:srgbClr val="FFFFFF"/>
-                  </a:solidFill>
-                </a:uFill>
-                <a:latin typeface="Arial"/>
-              </a:rPr>
-              <a:t> param name="accel_limit"           value="1.0" </a:t>
-            </a:r>
-          </a:p>
-          <a:p>
-            <a:r>
-              <a:rPr lang="en-US" sz="1800" b="0" strike="noStrike" spc="-1">
-                <a:solidFill>
-                  <a:srgbClr val="000000"/>
-                </a:solidFill>
-                <a:uFill>
-                  <a:solidFill>
-                    <a:srgbClr val="FFFFFF"/>
-                  </a:solidFill>
-                </a:uFill>
-                <a:latin typeface="Arial"/>
-              </a:rPr>
-              <a:t> param name="wheel_radius"       value="0.2413" </a:t>
-            </a:r>
-          </a:p>
-          <a:p>
-            <a:r>
-              <a:rPr lang="en-US" sz="1800" b="0" strike="noStrike" spc="-1">
-                <a:solidFill>
-                  <a:srgbClr val="000000"/>
-                </a:solidFill>
-                <a:uFill>
-                  <a:solidFill>
-                    <a:srgbClr val="FFFFFF"/>
-                  </a:solidFill>
-                </a:uFill>
-                <a:latin typeface="Arial"/>
-              </a:rPr>
-              <a:t> param name="wheel_base"         value="2.8498" </a:t>
-            </a:r>
-          </a:p>
-          <a:p>
-            <a:r>
-              <a:rPr lang="en-US" sz="1800" b="0" strike="noStrike" spc="-1">
-                <a:solidFill>
-                  <a:srgbClr val="000000"/>
-                </a:solidFill>
-                <a:uFill>
-                  <a:solidFill>
-                    <a:srgbClr val="FFFFFF"/>
-                  </a:solidFill>
-                </a:uFill>
-                <a:latin typeface="Arial"/>
-              </a:rPr>
-              <a:t> param name="steer_ratio"           value="14.8" </a:t>
-            </a:r>
-          </a:p>
-          <a:p>
-            <a:r>
-              <a:rPr lang="en-US" sz="1800" b="0" strike="noStrike" spc="-1">
-                <a:solidFill>
-                  <a:srgbClr val="000000"/>
-                </a:solidFill>
-                <a:uFill>
-                  <a:solidFill>
-                    <a:srgbClr val="FFFFFF"/>
-                  </a:solidFill>
-                </a:uFill>
-                <a:latin typeface="Arial"/>
-              </a:rPr>
-              <a:t> param name="max_lat_accel"     value="3.0" </a:t>
-            </a:r>
-          </a:p>
-          <a:p>
-            <a:r>
-              <a:rPr lang="en-US" sz="1800" b="0" strike="noStrike" spc="-1">
-                <a:solidFill>
-                  <a:srgbClr val="000000"/>
-                </a:solidFill>
-                <a:uFill>
-                  <a:solidFill>
-                    <a:srgbClr val="FFFFFF"/>
-                  </a:solidFill>
-                </a:uFill>
-                <a:latin typeface="Arial"/>
-              </a:rPr>
-              <a:t> param name="max_steer_angle" value="8.0" </a:t>
-            </a:r>
-          </a:p>
-          <a:p>
-            <a:r>
-              <a:rPr lang="en-US" sz="1800" b="0" strike="noStrike" spc="-1">
+              <a:rPr lang="en-US" sz="1800" b="0" strike="noStrike" spc="-1" dirty="0">
                 <a:solidFill>
                   <a:srgbClr val="000000"/>
                 </a:solidFill>
@@ -6737,7 +6344,23 @@
             </a:r>
           </a:p>
           <a:p>
-            <a:endParaRPr lang="en-US" sz="1800" b="0" strike="noStrike" spc="-1">
+            <a:r>
+              <a:rPr lang="en-US" sz="1800" b="0" strike="noStrike" spc="-1" dirty="0">
+                <a:solidFill>
+                  <a:srgbClr val="000000"/>
+                </a:solidFill>
+                <a:uFill>
+                  <a:solidFill>
+                    <a:srgbClr val="FFFFFF"/>
+                  </a:solidFill>
+                </a:uFill>
+                <a:latin typeface="Arial"/>
+              </a:rPr>
+              <a:t> </a:t>
+            </a:r>
+          </a:p>
+          <a:p>
+            <a:endParaRPr lang="en-US" sz="1800" b="0" strike="noStrike" spc="-1" dirty="0">
               <a:solidFill>
                 <a:srgbClr val="000000"/>
               </a:solidFill>
@@ -6805,7 +6428,7 @@
       </p:grpSpPr>
       <p:sp>
         <p:nvSpPr>
-          <p:cNvPr id="48" name="CustomShape 1"/>
+          <p:cNvPr id="50" name="CustomShape 1"/>
           <p:cNvSpPr/>
           <p:nvPr/>
         </p:nvSpPr>
@@ -6855,7 +6478,7 @@
                 </a:uFill>
                 <a:latin typeface="Arial"/>
               </a:rPr>
-              <a:t>twist_controller: dbw_node.py</a:t>
+              <a:t>twist_controller: low_pass.py</a:t>
             </a:r>
             <a:endParaRPr lang="en-US" sz="1800" b="0" strike="noStrike" spc="-1">
               <a:solidFill>
@@ -6871,265 +6494,8 @@
           </a:p>
         </p:txBody>
       </p:sp>
-      <p:sp>
-        <p:nvSpPr>
-          <p:cNvPr id="49" name="CustomShape 2"/>
-          <p:cNvSpPr/>
-          <p:nvPr/>
-        </p:nvSpPr>
-        <p:spPr>
-          <a:xfrm>
-            <a:off x="1373760" y="1410840"/>
-            <a:ext cx="7404120" cy="1113840"/>
-          </a:xfrm>
-          <a:prstGeom prst="rect">
-            <a:avLst/>
-          </a:prstGeom>
-          <a:noFill/>
-          <a:ln>
-            <a:noFill/>
-          </a:ln>
-        </p:spPr>
-        <p:style>
-          <a:lnRef idx="0">
-            <a:scrgbClr r="0" g="0" b="0"/>
-          </a:lnRef>
-          <a:fillRef idx="0">
-            <a:scrgbClr r="0" g="0" b="0"/>
-          </a:fillRef>
-          <a:effectRef idx="0">
-            <a:scrgbClr r="0" g="0" b="0"/>
-          </a:effectRef>
-          <a:fontRef idx="minor"/>
-        </p:style>
-        <p:txBody>
-          <a:bodyPr lIns="90000" tIns="45000" rIns="90000" bIns="45000"/>
-          <a:lstStyle/>
-          <a:p>
-            <a:r>
-              <a:rPr lang="en-US" sz="1800" b="0" u="sng" strike="noStrike" spc="-1" dirty="0" smtClean="0">
-                <a:solidFill>
-                  <a:srgbClr val="000000"/>
-                </a:solidFill>
-                <a:uFill>
-                  <a:solidFill>
-                    <a:srgbClr val="FFFFFF"/>
-                  </a:solidFill>
-                </a:uFill>
-                <a:latin typeface="Arial"/>
-              </a:rPr>
-              <a:t>This node calls the throttle, steering and brake controllers, it publishes the commands to the car/simulator.</a:t>
-            </a:r>
-          </a:p>
-          <a:p>
-            <a:endParaRPr lang="en-US" u="sng" spc="-1" dirty="0">
-              <a:solidFill>
-                <a:srgbClr val="000000"/>
-              </a:solidFill>
-              <a:uFill>
-                <a:solidFill>
-                  <a:srgbClr val="FFFFFF"/>
-                </a:solidFill>
-              </a:uFill>
-              <a:latin typeface="Arial"/>
-            </a:endParaRPr>
-          </a:p>
-          <a:p>
-            <a:r>
-              <a:rPr lang="en-US" u="sng" spc="-1" dirty="0" smtClean="0">
-                <a:solidFill>
-                  <a:srgbClr val="000000"/>
-                </a:solidFill>
-                <a:uFill>
-                  <a:solidFill>
-                    <a:srgbClr val="FFFFFF"/>
-                  </a:solidFill>
-                </a:uFill>
-                <a:latin typeface="Arial"/>
-              </a:rPr>
-              <a:t>Car model parameters are provided for use in the control design.</a:t>
-            </a:r>
-            <a:endParaRPr lang="en-US" sz="1800" b="0" strike="noStrike" spc="-1" dirty="0">
-              <a:solidFill>
-                <a:srgbClr val="000000"/>
-              </a:solidFill>
-              <a:uFill>
-                <a:solidFill>
-                  <a:srgbClr val="FFFFFF"/>
-                </a:solidFill>
-              </a:uFill>
-              <a:latin typeface="Arial"/>
-            </a:endParaRPr>
-          </a:p>
-          <a:p>
-            <a:r>
-              <a:rPr lang="en-US" sz="1800" b="0" strike="noStrike" spc="-1" dirty="0">
-                <a:solidFill>
-                  <a:srgbClr val="000000"/>
-                </a:solidFill>
-                <a:uFill>
-                  <a:solidFill>
-                    <a:srgbClr val="FFFFFF"/>
-                  </a:solidFill>
-                </a:uFill>
-                <a:latin typeface="Arial"/>
-              </a:rPr>
-              <a:t> </a:t>
-            </a:r>
-          </a:p>
-          <a:p>
-            <a:r>
-              <a:rPr lang="en-US" sz="1800" b="0" strike="noStrike" spc="-1" dirty="0">
-                <a:solidFill>
-                  <a:srgbClr val="000000"/>
-                </a:solidFill>
-                <a:uFill>
-                  <a:solidFill>
-                    <a:srgbClr val="FFFFFF"/>
-                  </a:solidFill>
-                </a:uFill>
-                <a:latin typeface="Arial"/>
-              </a:rPr>
-              <a:t> </a:t>
-            </a:r>
-          </a:p>
-          <a:p>
-            <a:endParaRPr lang="en-US" sz="1800" b="0" strike="noStrike" spc="-1" dirty="0">
-              <a:solidFill>
-                <a:srgbClr val="000000"/>
-              </a:solidFill>
-              <a:uFill>
-                <a:solidFill>
-                  <a:srgbClr val="FFFFFF"/>
-                </a:solidFill>
-              </a:uFill>
-              <a:latin typeface="Arial"/>
-            </a:endParaRPr>
-          </a:p>
-        </p:txBody>
-      </p:sp>
-    </p:spTree>
-  </p:cSld>
-  <p:clrMapOvr>
-    <a:masterClrMapping/>
-  </p:clrMapOvr>
-  <p:timing>
-    <p:tnLst>
-      <p:par>
-        <p:cTn id="1" dur="indefinite" restart="never" nodeType="tmRoot">
-          <p:childTnLst>
-            <p:seq>
-              <p:cTn id="2" nodeType="mainSeq"/>
-              <p:prevCondLst>
-                <p:cond evt="onPrev" delay="0">
-                  <p:tgtEl>
-                    <p:sldTgt/>
-                  </p:tgtEl>
-                </p:cond>
-              </p:prevCondLst>
-              <p:nextCondLst>
-                <p:cond evt="onNext" delay="0">
-                  <p:tgtEl>
-                    <p:sldTgt/>
-                  </p:tgtEl>
-                </p:cond>
-              </p:nextCondLst>
-            </p:seq>
-          </p:childTnLst>
-        </p:cTn>
-      </p:par>
-    </p:tnLst>
-  </p:timing>
-</p:sld>
-</file>
-
-<file path=ppt/slides/slide12.xml><?xml version="1.0" encoding="utf-8"?>
-<p:sld xmlns:a="http://schemas.openxmlformats.org/drawingml/2006/main" xmlns:r="http://schemas.openxmlformats.org/officeDocument/2006/relationships" xmlns:p="http://schemas.openxmlformats.org/presentationml/2006/main">
-  <p:cSld>
-    <p:spTree>
-      <p:nvGrpSpPr>
-        <p:cNvPr id="1" name=""/>
-        <p:cNvGrpSpPr/>
-        <p:nvPr/>
-      </p:nvGrpSpPr>
-      <p:grpSpPr>
-        <a:xfrm>
-          <a:off x="0" y="0"/>
-          <a:ext cx="0" cy="0"/>
-          <a:chOff x="0" y="0"/>
-          <a:chExt cx="0" cy="0"/>
-        </a:xfrm>
-      </p:grpSpPr>
-      <p:sp>
-        <p:nvSpPr>
-          <p:cNvPr id="50" name="CustomShape 1"/>
-          <p:cNvSpPr/>
-          <p:nvPr/>
-        </p:nvSpPr>
-        <p:spPr>
-          <a:xfrm>
-            <a:off x="504000" y="301320"/>
-            <a:ext cx="9071280" cy="1261800"/>
-          </a:xfrm>
-          <a:prstGeom prst="rect">
-            <a:avLst/>
-          </a:prstGeom>
-          <a:noFill/>
-          <a:ln>
-            <a:noFill/>
-          </a:ln>
-        </p:spPr>
-        <p:style>
-          <a:lnRef idx="0">
-            <a:scrgbClr r="0" g="0" b="0"/>
-          </a:lnRef>
-          <a:fillRef idx="0">
-            <a:scrgbClr r="0" g="0" b="0"/>
-          </a:fillRef>
-          <a:effectRef idx="0">
-            <a:scrgbClr r="0" g="0" b="0"/>
-          </a:effectRef>
-          <a:fontRef idx="minor"/>
-        </p:style>
-        <p:txBody>
-          <a:bodyPr lIns="0" tIns="0" rIns="0" bIns="0" anchor="ctr"/>
-          <a:lstStyle/>
-          <a:p>
-            <a:pPr algn="ctr">
-              <a:lnSpc>
-                <a:spcPct val="100000"/>
-              </a:lnSpc>
-            </a:pPr>
-            <a:r>
-              <a:rPr lang="en-US" sz="4400" b="0" strike="noStrike" spc="-1">
-                <a:solidFill>
-                  <a:srgbClr val="000000"/>
-                </a:solidFill>
-                <a:uFill>
-                  <a:solidFill>
-                    <a:srgbClr val="FFFFFF"/>
-                  </a:solidFill>
-                </a:uFill>
-                <a:latin typeface="Arial"/>
-              </a:rPr>
-              <a:t>twist_controller: low_pass.py</a:t>
-            </a:r>
-            <a:endParaRPr lang="en-US" sz="1800" b="0" strike="noStrike" spc="-1">
-              <a:solidFill>
-                <a:srgbClr val="000000"/>
-              </a:solidFill>
-              <a:uFill>
-                <a:solidFill>
-                  <a:srgbClr val="FFFFFF"/>
-                </a:solidFill>
-              </a:uFill>
-              <a:latin typeface="Arial"/>
-            </a:endParaRPr>
-          </a:p>
-        </p:txBody>
-      </p:sp>
-      <mc:AlternateContent xmlns:mc="http://schemas.openxmlformats.org/markup-compatibility/2006">
-        <mc:Choice xmlns:a14="http://schemas.microsoft.com/office/drawing/2010/main" Requires="a14">
+      <mc:AlternateContent xmlns:mc="http://schemas.openxmlformats.org/markup-compatibility/2006" xmlns:a14="http://schemas.microsoft.com/office/drawing/2010/main">
+        <mc:Choice Requires="a14">
           <p:sp>
             <p:nvSpPr>
               <p:cNvPr id="2" name="TextBox 1"/>
@@ -7152,6 +6518,7 @@
               </a:bodyPr>
               <a:lstStyle/>
               <a:p>
+                <a:pPr/>
                 <a14:m>
                   <m:oMathPara xmlns:m="http://schemas.openxmlformats.org/officeDocument/2006/math">
                     <m:oMathParaPr>
@@ -7327,7 +6694,7 @@
             </p:txBody>
           </p:sp>
         </mc:Choice>
-        <mc:Fallback>
+        <mc:Fallback xmlns="">
           <p:sp>
             <p:nvSpPr>
               <p:cNvPr id="2" name="TextBox 1"/>
@@ -7509,7 +6876,7 @@
 </p:sld>
 </file>
 
-<file path=ppt/slides/slide13.xml><?xml version="1.0" encoding="utf-8"?>
+<file path=ppt/slides/slide12.xml><?xml version="1.0" encoding="utf-8"?>
 <p:sld xmlns:a="http://schemas.openxmlformats.org/drawingml/2006/main" xmlns:r="http://schemas.openxmlformats.org/officeDocument/2006/relationships" xmlns:p="http://schemas.openxmlformats.org/presentationml/2006/main">
   <p:cSld>
     <p:spTree>
@@ -7740,7 +7107,7 @@
 </p:sld>
 </file>
 
-<file path=ppt/slides/slide14.xml><?xml version="1.0" encoding="utf-8"?>
+<file path=ppt/slides/slide13.xml><?xml version="1.0" encoding="utf-8"?>
 <p:sld xmlns:a="http://schemas.openxmlformats.org/drawingml/2006/main" xmlns:r="http://schemas.openxmlformats.org/officeDocument/2006/relationships" xmlns:p="http://schemas.openxmlformats.org/presentationml/2006/main">
   <p:cSld>
     <p:spTree>
@@ -8430,7 +7797,6 @@
               <a:rPr lang="en-US" b="1" dirty="0"/>
               <a:t>-</a:t>
             </a:r>
-            <a:endParaRPr lang="en-US" b="1" dirty="0"/>
           </a:p>
         </p:txBody>
       </p:sp>
@@ -9437,16 +8803,28 @@
           <a:lstStyle/>
           <a:p>
             <a:r>
-              <a:rPr lang="en-US" dirty="0" smtClean="0"/>
+              <a:rPr lang="en-US" dirty="0" smtClean="0">
+                <a:solidFill>
+                  <a:srgbClr val="FF0000"/>
+                </a:solidFill>
+              </a:rPr>
               <a:t>1 unit of distance traveled </a:t>
             </a:r>
           </a:p>
           <a:p>
             <a:r>
-              <a:rPr lang="en-US" dirty="0" smtClean="0"/>
+              <a:rPr lang="en-US" dirty="0" smtClean="0">
+                <a:solidFill>
+                  <a:srgbClr val="FF0000"/>
+                </a:solidFill>
+              </a:rPr>
               <a:t>between waypoints</a:t>
             </a:r>
-            <a:endParaRPr lang="en-US" dirty="0"/>
+            <a:endParaRPr lang="en-US" dirty="0">
+              <a:solidFill>
+                <a:srgbClr val="FF0000"/>
+              </a:solidFill>
+            </a:endParaRPr>
           </a:p>
         </p:txBody>
       </p:sp>
@@ -9578,16 +8956,28 @@
           <a:lstStyle/>
           <a:p>
             <a:r>
-              <a:rPr lang="en-US" dirty="0" smtClean="0"/>
+              <a:rPr lang="en-US" dirty="0" smtClean="0">
+                <a:solidFill>
+                  <a:srgbClr val="FF0000"/>
+                </a:solidFill>
+              </a:rPr>
               <a:t>Distance between waypoints </a:t>
             </a:r>
           </a:p>
           <a:p>
             <a:r>
-              <a:rPr lang="en-US" dirty="0" smtClean="0"/>
+              <a:rPr lang="en-US" dirty="0" smtClean="0">
+                <a:solidFill>
+                  <a:srgbClr val="FF0000"/>
+                </a:solidFill>
+              </a:rPr>
               <a:t>not constant, speed changing</a:t>
             </a:r>
-            <a:endParaRPr lang="en-US" dirty="0"/>
+            <a:endParaRPr lang="en-US" dirty="0">
+              <a:solidFill>
+                <a:srgbClr val="FF0000"/>
+              </a:solidFill>
+            </a:endParaRPr>
           </a:p>
         </p:txBody>
       </p:sp>
@@ -9946,16 +9336,28 @@
           <a:lstStyle/>
           <a:p>
             <a:r>
-              <a:rPr lang="en-US" dirty="0" smtClean="0"/>
+              <a:rPr lang="en-US" dirty="0" smtClean="0">
+                <a:solidFill>
+                  <a:srgbClr val="FF0000"/>
+                </a:solidFill>
+              </a:rPr>
               <a:t>Distance between waypoints </a:t>
             </a:r>
           </a:p>
           <a:p>
             <a:r>
-              <a:rPr lang="en-US" dirty="0" smtClean="0"/>
+              <a:rPr lang="en-US" dirty="0" smtClean="0">
+                <a:solidFill>
+                  <a:srgbClr val="FF0000"/>
+                </a:solidFill>
+              </a:rPr>
               <a:t>not constant, speed changing</a:t>
             </a:r>
-            <a:endParaRPr lang="en-US" dirty="0"/>
+            <a:endParaRPr lang="en-US" dirty="0">
+              <a:solidFill>
+                <a:srgbClr val="FF0000"/>
+              </a:solidFill>
+            </a:endParaRPr>
           </a:p>
         </p:txBody>
       </p:sp>
@@ -10333,7 +9735,7 @@
         </p:nvSpPr>
         <p:spPr>
           <a:xfrm>
-            <a:off x="6961516" y="5002300"/>
+            <a:off x="6770130" y="5002300"/>
             <a:ext cx="3198311" cy="646331"/>
           </a:xfrm>
           <a:prstGeom prst="rect">
@@ -10348,16 +9750,28 @@
           <a:lstStyle/>
           <a:p>
             <a:r>
-              <a:rPr lang="en-US" dirty="0" smtClean="0"/>
+              <a:rPr lang="en-US" dirty="0" smtClean="0">
+                <a:solidFill>
+                  <a:srgbClr val="FF0000"/>
+                </a:solidFill>
+              </a:rPr>
               <a:t>Distance between waypoints </a:t>
             </a:r>
           </a:p>
           <a:p>
             <a:r>
-              <a:rPr lang="en-US" dirty="0" smtClean="0"/>
+              <a:rPr lang="en-US" dirty="0" smtClean="0">
+                <a:solidFill>
+                  <a:srgbClr val="FF0000"/>
+                </a:solidFill>
+              </a:rPr>
               <a:t>not constant, speed changing</a:t>
             </a:r>
-            <a:endParaRPr lang="en-US" dirty="0"/>
+            <a:endParaRPr lang="en-US" dirty="0">
+              <a:solidFill>
+                <a:srgbClr val="FF0000"/>
+              </a:solidFill>
+            </a:endParaRPr>
           </a:p>
         </p:txBody>
       </p:sp>
@@ -10682,7 +10096,7 @@
       </p:grpSpPr>
       <p:sp>
         <p:nvSpPr>
-          <p:cNvPr id="38" name="CustomShape 1"/>
+          <p:cNvPr id="40" name="CustomShape 1"/>
           <p:cNvSpPr/>
           <p:nvPr/>
         </p:nvSpPr>
@@ -10732,7 +10146,7 @@
                 </a:uFill>
                 <a:latin typeface="Arial"/>
               </a:rPr>
-              <a:t>Waypoint File Format</a:t>
+              <a:t>waypoint_loader.py</a:t>
             </a:r>
             <a:endParaRPr lang="en-US" sz="1800" b="0" strike="noStrike" spc="-1">
               <a:solidFill>
@@ -10750,14 +10164,14 @@
       </p:sp>
       <p:sp>
         <p:nvSpPr>
-          <p:cNvPr id="39" name="CustomShape 2"/>
+          <p:cNvPr id="41" name="CustomShape 2"/>
           <p:cNvSpPr/>
           <p:nvPr/>
         </p:nvSpPr>
         <p:spPr>
           <a:xfrm>
-            <a:off x="914400" y="1573560"/>
-            <a:ext cx="8412120" cy="601920"/>
+            <a:off x="1373760" y="1756440"/>
+            <a:ext cx="7404120" cy="1113840"/>
           </a:xfrm>
           <a:prstGeom prst="rect">
             <a:avLst/>
@@ -10795,7 +10209,55 @@
                 </a:uFill>
                 <a:latin typeface="Arial"/>
               </a:rPr>
-              <a:t>quaternion_from_euler(roll(rad), pitch(rad), yaw(rad))</a:t>
+              <a:t>0.27778 is km/hr to m/s conversion</a:t>
+            </a:r>
+          </a:p>
+          <a:p>
+            <a:r>
+              <a:rPr lang="en-US" sz="1800" b="0" strike="noStrike" spc="-1">
+                <a:solidFill>
+                  <a:srgbClr val="000000"/>
+                </a:solidFill>
+                <a:uFill>
+                  <a:solidFill>
+                    <a:srgbClr val="FFFFFF"/>
+                  </a:solidFill>
+                </a:uFill>
+                <a:latin typeface="Arial"/>
+              </a:rPr>
+              <a:t>3.6 is m/s to km/hr conversion</a:t>
+            </a:r>
+          </a:p>
+          <a:p>
+            <a:r>
+              <a:rPr lang="en-US" sz="1800" b="0" strike="noStrike" spc="-1">
+                <a:solidFill>
+                  <a:srgbClr val="000000"/>
+                </a:solidFill>
+                <a:uFill>
+                  <a:solidFill>
+                    <a:srgbClr val="FFFFFF"/>
+                  </a:solidFill>
+                </a:uFill>
+                <a:latin typeface="Arial"/>
+              </a:rPr>
+              <a:t>Output waypoints are in /world frame</a:t>
+            </a:r>
+          </a:p>
+          <a:p>
+            <a:r>
+              <a:rPr lang="en-US" sz="1800" b="0" strike="noStrike" spc="-1">
+                <a:solidFill>
+                  <a:srgbClr val="000000"/>
+                </a:solidFill>
+                <a:uFill>
+                  <a:solidFill>
+                    <a:srgbClr val="FFFFFF"/>
+                  </a:solidFill>
+                </a:uFill>
+                <a:latin typeface="Arial"/>
+              </a:rPr>
+              <a:t>Target speed set in launch file (in km/hr)</a:t>
             </a:r>
           </a:p>
         </p:txBody>
@@ -10854,7 +10316,7 @@
       </p:grpSpPr>
       <p:sp>
         <p:nvSpPr>
-          <p:cNvPr id="40" name="CustomShape 1"/>
+          <p:cNvPr id="42" name="CustomShape 1"/>
           <p:cNvSpPr/>
           <p:nvPr/>
         </p:nvSpPr>
@@ -10904,7 +10366,7 @@
                 </a:uFill>
                 <a:latin typeface="Arial"/>
               </a:rPr>
-              <a:t>waypoint_loader.py</a:t>
+              <a:t>waypoint_updater.py</a:t>
             </a:r>
             <a:endParaRPr lang="en-US" sz="1800" b="0" strike="noStrike" spc="-1">
               <a:solidFill>
@@ -10922,14 +10384,14 @@
       </p:sp>
       <p:sp>
         <p:nvSpPr>
-          <p:cNvPr id="41" name="CustomShape 2"/>
+          <p:cNvPr id="43" name="CustomShape 2"/>
           <p:cNvSpPr/>
           <p:nvPr/>
         </p:nvSpPr>
         <p:spPr>
           <a:xfrm>
-            <a:off x="1373760" y="1756440"/>
-            <a:ext cx="7404120" cy="1113840"/>
+            <a:off x="1373760" y="1756800"/>
+            <a:ext cx="7404120" cy="857880"/>
           </a:xfrm>
           <a:prstGeom prst="rect">
             <a:avLst/>
@@ -10967,56 +10429,21 @@
                 </a:uFill>
                 <a:latin typeface="Arial"/>
               </a:rPr>
-              <a:t>0.27778 is km/hr to m/s conversion</a:t>
-            </a:r>
-          </a:p>
-          <a:p>
-            <a:r>
-              <a:rPr lang="en-US" sz="1800" b="0" strike="noStrike" spc="-1">
-                <a:solidFill>
-                  <a:srgbClr val="000000"/>
-                </a:solidFill>
-                <a:uFill>
-                  <a:solidFill>
-                    <a:srgbClr val="FFFFFF"/>
-                  </a:solidFill>
-                </a:uFill>
-                <a:latin typeface="Arial"/>
-              </a:rPr>
-              <a:t>3.6 is m/s to km/hr conversion</a:t>
-            </a:r>
-          </a:p>
-          <a:p>
-            <a:r>
-              <a:rPr lang="en-US" sz="1800" b="0" strike="noStrike" spc="-1">
-                <a:solidFill>
-                  <a:srgbClr val="000000"/>
-                </a:solidFill>
-                <a:uFill>
-                  <a:solidFill>
-                    <a:srgbClr val="FFFFFF"/>
-                  </a:solidFill>
-                </a:uFill>
-                <a:latin typeface="Arial"/>
-              </a:rPr>
-              <a:t>Output waypoints are in /world frame</a:t>
-            </a:r>
-          </a:p>
-          <a:p>
-            <a:r>
-              <a:rPr lang="en-US" sz="1800" b="0" strike="noStrike" spc="-1">
-                <a:solidFill>
-                  <a:srgbClr val="000000"/>
-                </a:solidFill>
-                <a:uFill>
-                  <a:solidFill>
-                    <a:srgbClr val="FFFFFF"/>
-                  </a:solidFill>
-                </a:uFill>
-                <a:latin typeface="Arial"/>
-              </a:rPr>
-              <a:t>Target speed set in launch file (in km/hr)</a:t>
-            </a:r>
+              <a:t>Hardcoded number of waypoints to publish (200)</a:t>
+            </a:r>
+          </a:p>
+          <a:p>
+            <a:endParaRPr lang="en-US" sz="1800" b="0" strike="noStrike" spc="-1">
+              <a:solidFill>
+                <a:srgbClr val="000000"/>
+              </a:solidFill>
+              <a:uFill>
+                <a:solidFill>
+                  <a:srgbClr val="FFFFFF"/>
+                </a:solidFill>
+              </a:uFill>
+              <a:latin typeface="Arial"/>
+            </a:endParaRPr>
           </a:p>
         </p:txBody>
       </p:sp>
@@ -11074,7 +10501,7 @@
       </p:grpSpPr>
       <p:sp>
         <p:nvSpPr>
-          <p:cNvPr id="42" name="CustomShape 1"/>
+          <p:cNvPr id="44" name="CustomShape 1"/>
           <p:cNvSpPr/>
           <p:nvPr/>
         </p:nvSpPr>
@@ -11124,7 +10551,7 @@
                 </a:uFill>
                 <a:latin typeface="Arial"/>
               </a:rPr>
-              <a:t>waypoint_updater.py</a:t>
+              <a:t>waypoint_follower</a:t>
             </a:r>
             <a:endParaRPr lang="en-US" sz="1800" b="0" strike="noStrike" spc="-1">
               <a:solidFill>
@@ -11142,7 +10569,7 @@
       </p:sp>
       <p:sp>
         <p:nvSpPr>
-          <p:cNvPr id="43" name="CustomShape 2"/>
+          <p:cNvPr id="45" name="CustomShape 2"/>
           <p:cNvSpPr/>
           <p:nvPr/>
         </p:nvSpPr>
@@ -11187,7 +10614,23 @@
                 </a:uFill>
                 <a:latin typeface="Arial"/>
               </a:rPr>
-              <a:t>Hardcoded number of waypoints to publish (200)</a:t>
+              <a:t>AKA pure_pursuit node</a:t>
+            </a:r>
+          </a:p>
+          <a:p>
+            <a:r>
+              <a:rPr lang="en-US" sz="1800" b="0" strike="noStrike" spc="-1">
+                <a:solidFill>
+                  <a:srgbClr val="000000"/>
+                </a:solidFill>
+                <a:uFill>
+                  <a:solidFill>
+                    <a:srgbClr val="FFFFFF"/>
+                  </a:solidFill>
+                </a:uFill>
+                <a:latin typeface="Arial"/>
+              </a:rPr>
+              <a:t>Not clear if this requires changes at this time</a:t>
             </a:r>
           </a:p>
           <a:p>
@@ -11259,7 +10702,7 @@
       </p:grpSpPr>
       <p:sp>
         <p:nvSpPr>
-          <p:cNvPr id="44" name="CustomShape 1"/>
+          <p:cNvPr id="46" name="CustomShape 1"/>
           <p:cNvSpPr/>
           <p:nvPr/>
         </p:nvSpPr>
@@ -11309,7 +10752,7 @@
                 </a:uFill>
                 <a:latin typeface="Arial"/>
               </a:rPr>
-              <a:t>waypoint_follower</a:t>
+              <a:t>twist_controller: launch files</a:t>
             </a:r>
             <a:endParaRPr lang="en-US" sz="1800" b="0" strike="noStrike" spc="-1">
               <a:solidFill>
@@ -11327,14 +10770,14 @@
       </p:sp>
       <p:sp>
         <p:nvSpPr>
-          <p:cNvPr id="45" name="CustomShape 2"/>
+          <p:cNvPr id="47" name="CustomShape 2"/>
           <p:cNvSpPr/>
           <p:nvPr/>
         </p:nvSpPr>
         <p:spPr>
           <a:xfrm>
-            <a:off x="1373760" y="1756800"/>
-            <a:ext cx="7404120" cy="857880"/>
+            <a:off x="1373760" y="1410840"/>
+            <a:ext cx="7404120" cy="5721120"/>
           </a:xfrm>
           <a:prstGeom prst="rect">
             <a:avLst/>
@@ -11361,7 +10804,7 @@
           <a:lstStyle/>
           <a:p>
             <a:r>
-              <a:rPr lang="en-US" sz="1800" b="0" strike="noStrike" spc="-1">
+              <a:rPr lang="en-US" sz="1800" b="0" u="sng" strike="noStrike" spc="-1">
                 <a:solidFill>
                   <a:srgbClr val="000000"/>
                 </a:solidFill>
@@ -11372,10 +10815,8 @@
                 </a:uFill>
                 <a:latin typeface="Arial"/>
               </a:rPr>
-              <a:t>AKA pure_pursuit node</a:t>
-            </a:r>
-          </a:p>
-          <a:p>
+              <a:t>3 launch files</a:t>
+            </a:r>
             <a:r>
               <a:rPr lang="en-US" sz="1800" b="0" strike="noStrike" spc="-1">
                 <a:solidFill>
@@ -11388,7 +10829,324 @@
                 </a:uFill>
                 <a:latin typeface="Arial"/>
               </a:rPr>
-              <a:t>Not clear if this requires changes at this time</a:t>
+              <a:t>:</a:t>
+            </a:r>
+          </a:p>
+          <a:p>
+            <a:r>
+              <a:rPr lang="en-US" sz="1800" b="0" strike="noStrike" spc="-1">
+                <a:solidFill>
+                  <a:srgbClr val="000000"/>
+                </a:solidFill>
+                <a:uFill>
+                  <a:solidFill>
+                    <a:srgbClr val="FFFFFF"/>
+                  </a:solidFill>
+                </a:uFill>
+                <a:latin typeface="Arial"/>
+              </a:rPr>
+              <a:t>dbw.launch – runs dbw_node.py and sets params below</a:t>
+            </a:r>
+          </a:p>
+          <a:p>
+            <a:r>
+              <a:rPr lang="en-US" sz="1800" b="0" strike="noStrike" spc="-1">
+                <a:solidFill>
+                  <a:srgbClr val="000000"/>
+                </a:solidFill>
+                <a:uFill>
+                  <a:solidFill>
+                    <a:srgbClr val="FFFFFF"/>
+                  </a:solidFill>
+                </a:uFill>
+                <a:latin typeface="Arial"/>
+              </a:rPr>
+              <a:t>dbw_test.launch – loads rosbag dbw_test.rosbag.bag</a:t>
+            </a:r>
+          </a:p>
+          <a:p>
+            <a:r>
+              <a:rPr lang="en-US" sz="1800" b="0" strike="noStrike" spc="-1">
+                <a:solidFill>
+                  <a:srgbClr val="000000"/>
+                </a:solidFill>
+                <a:uFill>
+                  <a:solidFill>
+                    <a:srgbClr val="FFFFFF"/>
+                  </a:solidFill>
+                </a:uFill>
+                <a:latin typeface="Arial"/>
+              </a:rPr>
+              <a:t>Assigns topics from rosbag:</a:t>
+            </a:r>
+          </a:p>
+          <a:p>
+            <a:r>
+              <a:rPr lang="en-US" sz="1800" b="0" strike="noStrike" spc="-1">
+                <a:solidFill>
+                  <a:srgbClr val="000000"/>
+                </a:solidFill>
+                <a:uFill>
+                  <a:solidFill>
+                    <a:srgbClr val="FFFFFF"/>
+                  </a:solidFill>
+                </a:uFill>
+                <a:latin typeface="Arial"/>
+              </a:rPr>
+              <a:t>/vehicle/throttle_cmd   =/actual/throttle_cmd </a:t>
+            </a:r>
+          </a:p>
+          <a:p>
+            <a:r>
+              <a:rPr lang="en-US" sz="1800" b="0" strike="noStrike" spc="-1">
+                <a:solidFill>
+                  <a:srgbClr val="000000"/>
+                </a:solidFill>
+                <a:uFill>
+                  <a:solidFill>
+                    <a:srgbClr val="FFFFFF"/>
+                  </a:solidFill>
+                </a:uFill>
+                <a:latin typeface="Arial"/>
+              </a:rPr>
+              <a:t>/vehicle/steering_cmd =/actual/steering_cmd</a:t>
+            </a:r>
+          </a:p>
+          <a:p>
+            <a:r>
+              <a:rPr lang="en-US" sz="1800" b="0" strike="noStrike" spc="-1">
+                <a:solidFill>
+                  <a:srgbClr val="000000"/>
+                </a:solidFill>
+                <a:uFill>
+                  <a:solidFill>
+                    <a:srgbClr val="FFFFFF"/>
+                  </a:solidFill>
+                </a:uFill>
+                <a:latin typeface="Arial"/>
+              </a:rPr>
+              <a:t>/vehicle/brake_cmd     =/actual/brake_cmd</a:t>
+            </a:r>
+          </a:p>
+          <a:p>
+            <a:r>
+              <a:rPr lang="en-US" sz="1800" b="0" strike="noStrike" spc="-1">
+                <a:solidFill>
+                  <a:srgbClr val="000000"/>
+                </a:solidFill>
+                <a:uFill>
+                  <a:solidFill>
+                    <a:srgbClr val="FFFFFF"/>
+                  </a:solidFill>
+                </a:uFill>
+                <a:latin typeface="Arial"/>
+              </a:rPr>
+              <a:t>dbw_sim.launch - runs dbw_node.py and sets params below </a:t>
+            </a:r>
+          </a:p>
+          <a:p>
+            <a:endParaRPr lang="en-US" sz="1800" b="0" strike="noStrike" spc="-1">
+              <a:solidFill>
+                <a:srgbClr val="000000"/>
+              </a:solidFill>
+              <a:uFill>
+                <a:solidFill>
+                  <a:srgbClr val="FFFFFF"/>
+                </a:solidFill>
+              </a:uFill>
+              <a:latin typeface="Arial"/>
+            </a:endParaRPr>
+          </a:p>
+          <a:p>
+            <a:r>
+              <a:rPr lang="en-US" sz="1800" b="0" strike="noStrike" spc="-1">
+                <a:solidFill>
+                  <a:srgbClr val="000000"/>
+                </a:solidFill>
+                <a:uFill>
+                  <a:solidFill>
+                    <a:srgbClr val="FFFFFF"/>
+                  </a:solidFill>
+                </a:uFill>
+                <a:latin typeface="Arial"/>
+              </a:rPr>
+              <a:t>Units?</a:t>
+            </a:r>
+          </a:p>
+          <a:p>
+            <a:r>
+              <a:rPr lang="en-US" sz="1800" b="0" strike="noStrike" spc="-1">
+                <a:solidFill>
+                  <a:srgbClr val="000000"/>
+                </a:solidFill>
+                <a:uFill>
+                  <a:solidFill>
+                    <a:srgbClr val="FFFFFF"/>
+                  </a:solidFill>
+                </a:uFill>
+                <a:latin typeface="Arial"/>
+              </a:rPr>
+              <a:t> param name="vehicle_mass"      value="1736.35" </a:t>
+            </a:r>
+          </a:p>
+          <a:p>
+            <a:r>
+              <a:rPr lang="en-US" sz="1800" b="0" strike="noStrike" spc="-1">
+                <a:solidFill>
+                  <a:srgbClr val="000000"/>
+                </a:solidFill>
+                <a:uFill>
+                  <a:solidFill>
+                    <a:srgbClr val="FFFFFF"/>
+                  </a:solidFill>
+                </a:uFill>
+                <a:latin typeface="Arial"/>
+              </a:rPr>
+              <a:t> param name="fuel_capacity"       value="13.5" </a:t>
+            </a:r>
+          </a:p>
+          <a:p>
+            <a:r>
+              <a:rPr lang="en-US" sz="1800" b="0" strike="noStrike" spc="-1">
+                <a:solidFill>
+                  <a:srgbClr val="000000"/>
+                </a:solidFill>
+                <a:uFill>
+                  <a:solidFill>
+                    <a:srgbClr val="FFFFFF"/>
+                  </a:solidFill>
+                </a:uFill>
+                <a:latin typeface="Arial"/>
+              </a:rPr>
+              <a:t> param name="brake_deadband" value="0.1" </a:t>
+            </a:r>
+          </a:p>
+          <a:p>
+            <a:r>
+              <a:rPr lang="en-US" sz="1800" b="0" strike="noStrike" spc="-1">
+                <a:solidFill>
+                  <a:srgbClr val="000000"/>
+                </a:solidFill>
+                <a:uFill>
+                  <a:solidFill>
+                    <a:srgbClr val="FFFFFF"/>
+                  </a:solidFill>
+                </a:uFill>
+                <a:latin typeface="Arial"/>
+              </a:rPr>
+              <a:t> param name="decel_limit"           value="-5.0" </a:t>
+            </a:r>
+          </a:p>
+          <a:p>
+            <a:r>
+              <a:rPr lang="en-US" sz="1800" b="0" strike="noStrike" spc="-1">
+                <a:solidFill>
+                  <a:srgbClr val="000000"/>
+                </a:solidFill>
+                <a:uFill>
+                  <a:solidFill>
+                    <a:srgbClr val="FFFFFF"/>
+                  </a:solidFill>
+                </a:uFill>
+                <a:latin typeface="Arial"/>
+              </a:rPr>
+              <a:t> param name="accel_limit"           value="1.0" </a:t>
+            </a:r>
+          </a:p>
+          <a:p>
+            <a:r>
+              <a:rPr lang="en-US" sz="1800" b="0" strike="noStrike" spc="-1">
+                <a:solidFill>
+                  <a:srgbClr val="000000"/>
+                </a:solidFill>
+                <a:uFill>
+                  <a:solidFill>
+                    <a:srgbClr val="FFFFFF"/>
+                  </a:solidFill>
+                </a:uFill>
+                <a:latin typeface="Arial"/>
+              </a:rPr>
+              <a:t> param name="wheel_radius"       value="0.2413" </a:t>
+            </a:r>
+          </a:p>
+          <a:p>
+            <a:r>
+              <a:rPr lang="en-US" sz="1800" b="0" strike="noStrike" spc="-1">
+                <a:solidFill>
+                  <a:srgbClr val="000000"/>
+                </a:solidFill>
+                <a:uFill>
+                  <a:solidFill>
+                    <a:srgbClr val="FFFFFF"/>
+                  </a:solidFill>
+                </a:uFill>
+                <a:latin typeface="Arial"/>
+              </a:rPr>
+              <a:t> param name="wheel_base"         value="2.8498" </a:t>
+            </a:r>
+          </a:p>
+          <a:p>
+            <a:r>
+              <a:rPr lang="en-US" sz="1800" b="0" strike="noStrike" spc="-1">
+                <a:solidFill>
+                  <a:srgbClr val="000000"/>
+                </a:solidFill>
+                <a:uFill>
+                  <a:solidFill>
+                    <a:srgbClr val="FFFFFF"/>
+                  </a:solidFill>
+                </a:uFill>
+                <a:latin typeface="Arial"/>
+              </a:rPr>
+              <a:t> param name="steer_ratio"           value="14.8" </a:t>
+            </a:r>
+          </a:p>
+          <a:p>
+            <a:r>
+              <a:rPr lang="en-US" sz="1800" b="0" strike="noStrike" spc="-1">
+                <a:solidFill>
+                  <a:srgbClr val="000000"/>
+                </a:solidFill>
+                <a:uFill>
+                  <a:solidFill>
+                    <a:srgbClr val="FFFFFF"/>
+                  </a:solidFill>
+                </a:uFill>
+                <a:latin typeface="Arial"/>
+              </a:rPr>
+              <a:t> param name="max_lat_accel"     value="3.0" </a:t>
+            </a:r>
+          </a:p>
+          <a:p>
+            <a:r>
+              <a:rPr lang="en-US" sz="1800" b="0" strike="noStrike" spc="-1">
+                <a:solidFill>
+                  <a:srgbClr val="000000"/>
+                </a:solidFill>
+                <a:uFill>
+                  <a:solidFill>
+                    <a:srgbClr val="FFFFFF"/>
+                  </a:solidFill>
+                </a:uFill>
+                <a:latin typeface="Arial"/>
+              </a:rPr>
+              <a:t> param name="max_steer_angle" value="8.0" </a:t>
+            </a:r>
+          </a:p>
+          <a:p>
+            <a:r>
+              <a:rPr lang="en-US" sz="1800" b="0" strike="noStrike" spc="-1">
+                <a:solidFill>
+                  <a:srgbClr val="000000"/>
+                </a:solidFill>
+                <a:uFill>
+                  <a:solidFill>
+                    <a:srgbClr val="FFFFFF"/>
+                  </a:solidFill>
+                </a:uFill>
+                <a:latin typeface="Arial"/>
+              </a:rPr>
+              <a:t> </a:t>
             </a:r>
           </a:p>
           <a:p>
@@ -12195,7 +11953,7 @@
 </file>
 
 <file path=customXml/itemProps1.xml><?xml version="1.0" encoding="utf-8"?>
-<ds:datastoreItem xmlns:ds="http://schemas.openxmlformats.org/officeDocument/2006/customXml" ds:itemID="{84A53E0D-132B-4506-85B3-C345EE4C0EF7}">
+<ds:datastoreItem xmlns:ds="http://schemas.openxmlformats.org/officeDocument/2006/customXml" ds:itemID="{8E3230BF-CCEB-4887-8818-BFD2A4A1B8FB}">
   <ds:schemaRefs>
     <ds:schemaRef ds:uri="http://www.w3.org/2001/XMLSchema"/>
     <ds:schemaRef ds:uri="http://www.boldonjames.com/2008/01/sie/internal/label"/>

</xml_diff>